<commit_message>
atualizado apresentação dos projetos
</commit_message>
<xml_diff>
--- a/Apresentação Cesup Rede/Projeto 1.pptx
+++ b/Apresentação Cesup Rede/Projeto 1.pptx
@@ -252,7 +252,7 @@
           <a:p>
             <a:fld id="{451DA068-CB82-4A13-8DD8-5B6FC800C9FB}" type="datetimeFigureOut">
               <a:rPr lang="pt-BR" smtClean="0"/>
-              <a:t>14/11/2020</a:t>
+              <a:t>15/11/2020</a:t>
             </a:fld>
             <a:endParaRPr lang="pt-BR"/>
           </a:p>
@@ -422,7 +422,7 @@
           <a:p>
             <a:fld id="{451DA068-CB82-4A13-8DD8-5B6FC800C9FB}" type="datetimeFigureOut">
               <a:rPr lang="pt-BR" smtClean="0"/>
-              <a:t>14/11/2020</a:t>
+              <a:t>15/11/2020</a:t>
             </a:fld>
             <a:endParaRPr lang="pt-BR"/>
           </a:p>
@@ -602,7 +602,7 @@
           <a:p>
             <a:fld id="{451DA068-CB82-4A13-8DD8-5B6FC800C9FB}" type="datetimeFigureOut">
               <a:rPr lang="pt-BR" smtClean="0"/>
-              <a:t>14/11/2020</a:t>
+              <a:t>15/11/2020</a:t>
             </a:fld>
             <a:endParaRPr lang="pt-BR"/>
           </a:p>
@@ -899,7 +899,7 @@
           <a:p>
             <a:fld id="{451DA068-CB82-4A13-8DD8-5B6FC800C9FB}" type="datetimeFigureOut">
               <a:rPr lang="pt-BR" smtClean="0"/>
-              <a:t>14/11/2020</a:t>
+              <a:t>15/11/2020</a:t>
             </a:fld>
             <a:endParaRPr lang="pt-BR"/>
           </a:p>
@@ -1145,7 +1145,7 @@
           <a:p>
             <a:fld id="{451DA068-CB82-4A13-8DD8-5B6FC800C9FB}" type="datetimeFigureOut">
               <a:rPr lang="pt-BR" smtClean="0"/>
-              <a:t>14/11/2020</a:t>
+              <a:t>15/11/2020</a:t>
             </a:fld>
             <a:endParaRPr lang="pt-BR"/>
           </a:p>
@@ -1377,7 +1377,7 @@
           <a:p>
             <a:fld id="{451DA068-CB82-4A13-8DD8-5B6FC800C9FB}" type="datetimeFigureOut">
               <a:rPr lang="pt-BR" smtClean="0"/>
-              <a:t>14/11/2020</a:t>
+              <a:t>15/11/2020</a:t>
             </a:fld>
             <a:endParaRPr lang="pt-BR"/>
           </a:p>
@@ -1744,7 +1744,7 @@
           <a:p>
             <a:fld id="{451DA068-CB82-4A13-8DD8-5B6FC800C9FB}" type="datetimeFigureOut">
               <a:rPr lang="pt-BR" smtClean="0"/>
-              <a:t>14/11/2020</a:t>
+              <a:t>15/11/2020</a:t>
             </a:fld>
             <a:endParaRPr lang="pt-BR"/>
           </a:p>
@@ -1862,7 +1862,7 @@
           <a:p>
             <a:fld id="{451DA068-CB82-4A13-8DD8-5B6FC800C9FB}" type="datetimeFigureOut">
               <a:rPr lang="pt-BR" smtClean="0"/>
-              <a:t>14/11/2020</a:t>
+              <a:t>15/11/2020</a:t>
             </a:fld>
             <a:endParaRPr lang="pt-BR"/>
           </a:p>
@@ -1957,7 +1957,7 @@
           <a:p>
             <a:fld id="{451DA068-CB82-4A13-8DD8-5B6FC800C9FB}" type="datetimeFigureOut">
               <a:rPr lang="pt-BR" smtClean="0"/>
-              <a:t>14/11/2020</a:t>
+              <a:t>15/11/2020</a:t>
             </a:fld>
             <a:endParaRPr lang="pt-BR"/>
           </a:p>
@@ -2234,7 +2234,7 @@
           <a:p>
             <a:fld id="{451DA068-CB82-4A13-8DD8-5B6FC800C9FB}" type="datetimeFigureOut">
               <a:rPr lang="pt-BR" smtClean="0"/>
-              <a:t>14/11/2020</a:t>
+              <a:t>15/11/2020</a:t>
             </a:fld>
             <a:endParaRPr lang="pt-BR"/>
           </a:p>
@@ -2487,7 +2487,7 @@
           <a:p>
             <a:fld id="{451DA068-CB82-4A13-8DD8-5B6FC800C9FB}" type="datetimeFigureOut">
               <a:rPr lang="pt-BR" smtClean="0"/>
-              <a:t>14/11/2020</a:t>
+              <a:t>15/11/2020</a:t>
             </a:fld>
             <a:endParaRPr lang="pt-BR"/>
           </a:p>
@@ -2700,7 +2700,7 @@
           <a:p>
             <a:fld id="{451DA068-CB82-4A13-8DD8-5B6FC800C9FB}" type="datetimeFigureOut">
               <a:rPr lang="pt-BR" smtClean="0"/>
-              <a:t>14/11/2020</a:t>
+              <a:t>15/11/2020</a:t>
             </a:fld>
             <a:endParaRPr lang="pt-BR"/>
           </a:p>
@@ -3315,7 +3315,11 @@
             </a:r>
             <a:r>
               <a:rPr lang="pt-BR" sz="2000" dirty="0" smtClean="0"/>
-              <a:t>cliente e as ações começam</a:t>
+              <a:t>cliente, </a:t>
+            </a:r>
+            <a:r>
+              <a:rPr lang="pt-BR" sz="2000" dirty="0" smtClean="0"/>
+              <a:t>e as ações começam</a:t>
             </a:r>
           </a:p>
           <a:p>
@@ -3513,8 +3517,8 @@
         </p:nvSpPr>
         <p:spPr>
           <a:xfrm>
-            <a:off x="646842" y="947537"/>
-            <a:ext cx="11271034" cy="3139321"/>
+            <a:off x="553792" y="1187604"/>
+            <a:ext cx="11464100" cy="3970318"/>
           </a:xfrm>
           <a:prstGeom prst="rect">
             <a:avLst/>
@@ -3529,40 +3533,87 @@
           <a:p>
             <a:r>
               <a:rPr lang="pt-BR" dirty="0"/>
-              <a:t>Quando você envia o NPS, está abrindo um loop (ciclo) que precisará ser fechado de acordo com a resposta do cliente.</a:t>
-            </a:r>
-          </a:p>
-          <a:p>
+              <a:t>Quando você envia </a:t>
+            </a:r>
+            <a:r>
+              <a:rPr lang="pt-BR" dirty="0" smtClean="0"/>
+              <a:t>uma avaliação, </a:t>
+            </a:r>
+            <a:r>
+              <a:rPr lang="pt-BR" dirty="0"/>
+              <a:t>está abrindo um loop (ciclo) que precisará ser fechado de acordo com a resposta </a:t>
+            </a:r>
             <a:endParaRPr lang="pt-BR" dirty="0" smtClean="0"/>
           </a:p>
           <a:p>
             <a:r>
               <a:rPr lang="pt-BR" dirty="0" smtClean="0"/>
-              <a:t>Avaliação feita </a:t>
+              <a:t>do </a:t>
             </a:r>
             <a:r>
               <a:rPr lang="pt-BR" dirty="0"/>
-              <a:t>para que você consiga fechar o ciclo com o cliente. Isso significa entrar em contato </a:t>
+              <a:t>cliente.</a:t>
+            </a:r>
+          </a:p>
+          <a:p>
+            <a:endParaRPr lang="pt-PT" dirty="0" smtClean="0"/>
+          </a:p>
+          <a:p>
+            <a:r>
+              <a:rPr lang="pt-BR" dirty="0"/>
+              <a:t>Busque entrar em </a:t>
             </a:r>
             <a:r>
               <a:rPr lang="pt-BR" dirty="0" smtClean="0"/>
-              <a:t>com</a:t>
-            </a:r>
+              <a:t>contato de forma humanizada</a:t>
+            </a:r>
+            <a:r>
+              <a:rPr lang="pt-BR" dirty="0"/>
+              <a:t> com cada cliente que respondeu essa questão e, principalmente, tente </a:t>
+            </a:r>
+            <a:endParaRPr lang="pt-BR" dirty="0" smtClean="0"/>
           </a:p>
           <a:p>
             <a:r>
               <a:rPr lang="pt-BR" dirty="0" smtClean="0"/>
-              <a:t>ele </a:t>
+              <a:t>atender </a:t>
             </a:r>
             <a:r>
               <a:rPr lang="pt-BR" dirty="0"/>
-              <a:t>sempre após o feedback dado.</a:t>
-            </a:r>
+              <a:t>suas </a:t>
+            </a:r>
+            <a:r>
+              <a:rPr lang="pt-BR" dirty="0" smtClean="0"/>
+              <a:t>demandas.</a:t>
+            </a:r>
+            <a:endParaRPr lang="pt-BR" dirty="0"/>
           </a:p>
           <a:p>
             <a:r>
               <a:rPr lang="pt-BR" dirty="0"/>
-              <a:t>Seja para solucionar o problema constatado pelos Detratores e </a:t>
+              <a:t>Seus clientes precisam saber que o feedback foi importante, e ele deve servir como base para novas </a:t>
+            </a:r>
+            <a:r>
+              <a:rPr lang="pt-BR" dirty="0" smtClean="0"/>
+              <a:t>ações</a:t>
+            </a:r>
+            <a:r>
+              <a:rPr lang="pt-BR" dirty="0"/>
+              <a:t>.</a:t>
+            </a:r>
+            <a:endParaRPr lang="pt-BR" dirty="0" smtClean="0"/>
+          </a:p>
+          <a:p>
+            <a:endParaRPr lang="pt-BR" dirty="0" smtClean="0"/>
+          </a:p>
+          <a:p>
+            <a:r>
+              <a:rPr lang="pt-BR" dirty="0" smtClean="0"/>
+              <a:t>Seja </a:t>
+            </a:r>
+            <a:r>
+              <a:rPr lang="pt-BR" dirty="0"/>
+              <a:t>para solucionar o problema constatado pelos Detratores e </a:t>
             </a:r>
             <a:r>
               <a:rPr lang="pt-BR" dirty="0" smtClean="0"/>
@@ -3583,7 +3634,23 @@
           <a:p>
             <a:r>
               <a:rPr lang="pt-BR" dirty="0"/>
-              <a:t>Os feedbacks são essenciais para que a empresa saiba o que pode/deve ser melhorado, </a:t>
+              <a:t>Os feedbacks são essenciais para </a:t>
+            </a:r>
+            <a:r>
+              <a:rPr lang="pt-BR" dirty="0" smtClean="0"/>
+              <a:t>entender o </a:t>
+            </a:r>
+            <a:r>
+              <a:rPr lang="pt-BR" dirty="0"/>
+              <a:t>que pode/deve ser </a:t>
+            </a:r>
+            <a:r>
+              <a:rPr lang="pt-BR" dirty="0" smtClean="0"/>
+              <a:t>melhorado</a:t>
+            </a:r>
+            <a:r>
+              <a:rPr lang="pt-BR" dirty="0"/>
+              <a:t>.</a:t>
             </a:r>
           </a:p>
           <a:p>
@@ -3608,7 +3675,7 @@
         </p:nvSpPr>
         <p:spPr>
           <a:xfrm>
-            <a:off x="553792" y="4377365"/>
+            <a:off x="1348923" y="4375314"/>
             <a:ext cx="4481848" cy="1624191"/>
           </a:xfrm>
           <a:prstGeom prst="rect">
@@ -3695,7 +3762,7 @@
         </p:nvSpPr>
         <p:spPr>
           <a:xfrm>
-            <a:off x="5780469" y="4377365"/>
+            <a:off x="6575600" y="4375314"/>
             <a:ext cx="4481848" cy="1624191"/>
           </a:xfrm>
           <a:prstGeom prst="rect">
@@ -4574,7 +4641,7 @@
         </p:nvSpPr>
         <p:spPr>
           <a:xfrm>
-            <a:off x="1063642" y="2188997"/>
+            <a:off x="1063642" y="1841267"/>
             <a:ext cx="9648423" cy="2677656"/>
           </a:xfrm>
           <a:prstGeom prst="rect">
@@ -4646,6 +4713,30 @@
           </a:p>
         </p:txBody>
       </p:sp>
+      <p:pic>
+        <p:nvPicPr>
+          <p:cNvPr id="5" name="Imagem 4"/>
+          <p:cNvPicPr>
+            <a:picLocks noChangeAspect="1"/>
+          </p:cNvPicPr>
+          <p:nvPr/>
+        </p:nvPicPr>
+        <p:blipFill>
+          <a:blip r:embed="rId2"/>
+          <a:stretch>
+            <a:fillRect/>
+          </a:stretch>
+        </p:blipFill>
+        <p:spPr>
+          <a:xfrm>
+            <a:off x="5306995" y="5283865"/>
+            <a:ext cx="1161715" cy="1265555"/>
+          </a:xfrm>
+          <a:prstGeom prst="rect">
+            <a:avLst/>
+          </a:prstGeom>
+        </p:spPr>
+      </p:pic>
     </p:spTree>
     <p:extLst>
       <p:ext uri="{BB962C8B-B14F-4D97-AF65-F5344CB8AC3E}">
@@ -4746,7 +4837,7 @@
         </p:nvSpPr>
         <p:spPr>
           <a:xfrm>
-            <a:off x="888642" y="2550016"/>
+            <a:off x="888642" y="2266678"/>
             <a:ext cx="10619895" cy="1569660"/>
           </a:xfrm>
           <a:prstGeom prst="rect">
@@ -4803,6 +4894,30 @@
           </a:p>
         </p:txBody>
       </p:sp>
+      <p:pic>
+        <p:nvPicPr>
+          <p:cNvPr id="4" name="Imagem 3"/>
+          <p:cNvPicPr>
+            <a:picLocks noChangeAspect="1"/>
+          </p:cNvPicPr>
+          <p:nvPr/>
+        </p:nvPicPr>
+        <p:blipFill>
+          <a:blip r:embed="rId2"/>
+          <a:stretch>
+            <a:fillRect/>
+          </a:stretch>
+        </p:blipFill>
+        <p:spPr>
+          <a:xfrm>
+            <a:off x="5336576" y="4545569"/>
+            <a:ext cx="1724025" cy="1733550"/>
+          </a:xfrm>
+          <a:prstGeom prst="rect">
+            <a:avLst/>
+          </a:prstGeom>
+        </p:spPr>
+      </p:pic>
     </p:spTree>
     <p:extLst>
       <p:ext uri="{BB962C8B-B14F-4D97-AF65-F5344CB8AC3E}">

</xml_diff>